<commit_message>
Ny bild i pres.
</commit_message>
<xml_diff>
--- a/Intro-svn.pptx
+++ b/Intro-svn.pptx
@@ -3945,6 +3945,749 @@
           <a:chExt cx="0" cy="0"/>
         </a:xfrm>
       </p:grpSpPr>
+      <p:sp>
+        <p:nvSpPr>
+          <p:cNvPr id="2" name="Title 1"/>
+          <p:cNvSpPr>
+            <a:spLocks noGrp="1"/>
+          </p:cNvSpPr>
+          <p:nvPr>
+            <p:ph type="title"/>
+          </p:nvPr>
+        </p:nvSpPr>
+        <p:spPr/>
+        <p:txBody>
+          <a:bodyPr/>
+          <a:lstStyle/>
+          <a:p>
+            <a:r>
+              <a:rPr lang="sv-SE" dirty="0" err="1" smtClean="0"/>
+              <a:t>Branching</a:t>
+            </a:r>
+            <a:endParaRPr lang="sv-SE" dirty="0"/>
+          </a:p>
+        </p:txBody>
+      </p:sp>
+      <p:sp>
+        <p:nvSpPr>
+          <p:cNvPr id="4" name="Rectangle 3"/>
+          <p:cNvSpPr/>
+          <p:nvPr/>
+        </p:nvSpPr>
+        <p:spPr>
+          <a:xfrm>
+            <a:off x="1583267" y="4581128"/>
+            <a:ext cx="984341" cy="360040"/>
+          </a:xfrm>
+          <a:prstGeom prst="rect">
+            <a:avLst/>
+          </a:prstGeom>
+        </p:spPr>
+        <p:style>
+          <a:lnRef idx="1">
+            <a:schemeClr val="accent1"/>
+          </a:lnRef>
+          <a:fillRef idx="3">
+            <a:schemeClr val="accent1"/>
+          </a:fillRef>
+          <a:effectRef idx="2">
+            <a:schemeClr val="accent1"/>
+          </a:effectRef>
+          <a:fontRef idx="minor">
+            <a:schemeClr val="lt1"/>
+          </a:fontRef>
+        </p:style>
+        <p:txBody>
+          <a:bodyPr rtlCol="0" anchor="ctr"/>
+          <a:lstStyle/>
+          <a:p>
+            <a:pPr algn="ctr"/>
+            <a:r>
+              <a:rPr lang="sv-SE" dirty="0" smtClean="0"/>
+              <a:t>trunk</a:t>
+            </a:r>
+            <a:endParaRPr lang="sv-SE" dirty="0"/>
+          </a:p>
+        </p:txBody>
+      </p:sp>
+      <p:sp>
+        <p:nvSpPr>
+          <p:cNvPr id="5" name="Rectangle 4"/>
+          <p:cNvSpPr/>
+          <p:nvPr/>
+        </p:nvSpPr>
+        <p:spPr>
+          <a:xfrm>
+            <a:off x="3612165" y="4581128"/>
+            <a:ext cx="984341" cy="360040"/>
+          </a:xfrm>
+          <a:prstGeom prst="rect">
+            <a:avLst/>
+          </a:prstGeom>
+        </p:spPr>
+        <p:style>
+          <a:lnRef idx="1">
+            <a:schemeClr val="accent1"/>
+          </a:lnRef>
+          <a:fillRef idx="3">
+            <a:schemeClr val="accent1"/>
+          </a:fillRef>
+          <a:effectRef idx="2">
+            <a:schemeClr val="accent1"/>
+          </a:effectRef>
+          <a:fontRef idx="minor">
+            <a:schemeClr val="lt1"/>
+          </a:fontRef>
+        </p:style>
+        <p:txBody>
+          <a:bodyPr rtlCol="0" anchor="ctr"/>
+          <a:lstStyle/>
+          <a:p>
+            <a:pPr algn="ctr"/>
+            <a:r>
+              <a:rPr lang="sv-SE" dirty="0" smtClean="0"/>
+              <a:t>trunk</a:t>
+            </a:r>
+            <a:endParaRPr lang="sv-SE" dirty="0"/>
+          </a:p>
+        </p:txBody>
+      </p:sp>
+      <p:sp>
+        <p:nvSpPr>
+          <p:cNvPr id="6" name="Rectangle 5"/>
+          <p:cNvSpPr/>
+          <p:nvPr/>
+        </p:nvSpPr>
+        <p:spPr>
+          <a:xfrm>
+            <a:off x="6372240" y="4581128"/>
+            <a:ext cx="984341" cy="360040"/>
+          </a:xfrm>
+          <a:prstGeom prst="rect">
+            <a:avLst/>
+          </a:prstGeom>
+        </p:spPr>
+        <p:style>
+          <a:lnRef idx="1">
+            <a:schemeClr val="accent1"/>
+          </a:lnRef>
+          <a:fillRef idx="3">
+            <a:schemeClr val="accent1"/>
+          </a:fillRef>
+          <a:effectRef idx="2">
+            <a:schemeClr val="accent1"/>
+          </a:effectRef>
+          <a:fontRef idx="minor">
+            <a:schemeClr val="lt1"/>
+          </a:fontRef>
+        </p:style>
+        <p:txBody>
+          <a:bodyPr rtlCol="0" anchor="ctr"/>
+          <a:lstStyle/>
+          <a:p>
+            <a:pPr algn="ctr"/>
+            <a:r>
+              <a:rPr lang="sv-SE" dirty="0" smtClean="0"/>
+              <a:t>trunk</a:t>
+            </a:r>
+            <a:endParaRPr lang="sv-SE" dirty="0"/>
+          </a:p>
+        </p:txBody>
+      </p:sp>
+      <p:sp>
+        <p:nvSpPr>
+          <p:cNvPr id="7" name="Rectangle 6"/>
+          <p:cNvSpPr/>
+          <p:nvPr/>
+        </p:nvSpPr>
+        <p:spPr>
+          <a:xfrm>
+            <a:off x="9055015" y="4581127"/>
+            <a:ext cx="984341" cy="360040"/>
+          </a:xfrm>
+          <a:prstGeom prst="rect">
+            <a:avLst/>
+          </a:prstGeom>
+        </p:spPr>
+        <p:style>
+          <a:lnRef idx="1">
+            <a:schemeClr val="accent1"/>
+          </a:lnRef>
+          <a:fillRef idx="3">
+            <a:schemeClr val="accent1"/>
+          </a:fillRef>
+          <a:effectRef idx="2">
+            <a:schemeClr val="accent1"/>
+          </a:effectRef>
+          <a:fontRef idx="minor">
+            <a:schemeClr val="lt1"/>
+          </a:fontRef>
+        </p:style>
+        <p:txBody>
+          <a:bodyPr rtlCol="0" anchor="ctr"/>
+          <a:lstStyle/>
+          <a:p>
+            <a:pPr algn="ctr"/>
+            <a:r>
+              <a:rPr lang="sv-SE" dirty="0" smtClean="0"/>
+              <a:t>trunk</a:t>
+            </a:r>
+            <a:endParaRPr lang="sv-SE" dirty="0"/>
+          </a:p>
+        </p:txBody>
+      </p:sp>
+      <p:sp>
+        <p:nvSpPr>
+          <p:cNvPr id="8" name="Rectangle 7"/>
+          <p:cNvSpPr/>
+          <p:nvPr/>
+        </p:nvSpPr>
+        <p:spPr>
+          <a:xfrm>
+            <a:off x="5159896" y="3365117"/>
+            <a:ext cx="1080120" cy="360040"/>
+          </a:xfrm>
+          <a:prstGeom prst="rect">
+            <a:avLst/>
+          </a:prstGeom>
+        </p:spPr>
+        <p:style>
+          <a:lnRef idx="1">
+            <a:schemeClr val="accent1"/>
+          </a:lnRef>
+          <a:fillRef idx="3">
+            <a:schemeClr val="accent1"/>
+          </a:fillRef>
+          <a:effectRef idx="2">
+            <a:schemeClr val="accent1"/>
+          </a:effectRef>
+          <a:fontRef idx="minor">
+            <a:schemeClr val="lt1"/>
+          </a:fontRef>
+        </p:style>
+        <p:txBody>
+          <a:bodyPr rtlCol="0" anchor="ctr"/>
+          <a:lstStyle/>
+          <a:p>
+            <a:pPr algn="ctr"/>
+            <a:r>
+              <a:rPr lang="sv-SE" dirty="0" err="1" smtClean="0"/>
+              <a:t>branch</a:t>
+            </a:r>
+            <a:r>
+              <a:rPr lang="sv-SE" dirty="0" smtClean="0"/>
+              <a:t> 1</a:t>
+            </a:r>
+            <a:endParaRPr lang="sv-SE" dirty="0"/>
+          </a:p>
+        </p:txBody>
+      </p:sp>
+      <p:sp>
+        <p:nvSpPr>
+          <p:cNvPr id="9" name="Rectangle 8"/>
+          <p:cNvSpPr/>
+          <p:nvPr/>
+        </p:nvSpPr>
+        <p:spPr>
+          <a:xfrm>
+            <a:off x="7245156" y="3372421"/>
+            <a:ext cx="1152128" cy="360040"/>
+          </a:xfrm>
+          <a:prstGeom prst="rect">
+            <a:avLst/>
+          </a:prstGeom>
+        </p:spPr>
+        <p:style>
+          <a:lnRef idx="1">
+            <a:schemeClr val="accent1"/>
+          </a:lnRef>
+          <a:fillRef idx="3">
+            <a:schemeClr val="accent1"/>
+          </a:fillRef>
+          <a:effectRef idx="2">
+            <a:schemeClr val="accent1"/>
+          </a:effectRef>
+          <a:fontRef idx="minor">
+            <a:schemeClr val="lt1"/>
+          </a:fontRef>
+        </p:style>
+        <p:txBody>
+          <a:bodyPr rtlCol="0" anchor="ctr"/>
+          <a:lstStyle/>
+          <a:p>
+            <a:pPr algn="ctr"/>
+            <a:r>
+              <a:rPr lang="sv-SE" dirty="0" err="1" smtClean="0"/>
+              <a:t>branch</a:t>
+            </a:r>
+            <a:r>
+              <a:rPr lang="sv-SE" dirty="0" smtClean="0"/>
+              <a:t> 1</a:t>
+            </a:r>
+            <a:endParaRPr lang="sv-SE" dirty="0"/>
+          </a:p>
+        </p:txBody>
+      </p:sp>
+      <p:cxnSp>
+        <p:nvCxnSpPr>
+          <p:cNvPr id="11" name="Curved Connector 10"/>
+          <p:cNvCxnSpPr>
+            <a:stCxn id="5" idx="0"/>
+            <a:endCxn id="8" idx="1"/>
+          </p:cNvCxnSpPr>
+          <p:nvPr/>
+        </p:nvCxnSpPr>
+        <p:spPr>
+          <a:xfrm rot="5400000" flipH="1" flipV="1">
+            <a:off x="4114121" y="3535353"/>
+            <a:ext cx="1035991" cy="1055560"/>
+          </a:xfrm>
+          <a:prstGeom prst="curvedConnector2">
+            <a:avLst/>
+          </a:prstGeom>
+          <a:ln>
+            <a:tailEnd type="triangle"/>
+          </a:ln>
+        </p:spPr>
+        <p:style>
+          <a:lnRef idx="2">
+            <a:schemeClr val="accent1"/>
+          </a:lnRef>
+          <a:fillRef idx="0">
+            <a:schemeClr val="accent1"/>
+          </a:fillRef>
+          <a:effectRef idx="1">
+            <a:schemeClr val="accent1"/>
+          </a:effectRef>
+          <a:fontRef idx="minor">
+            <a:schemeClr val="tx1"/>
+          </a:fontRef>
+        </p:style>
+      </p:cxnSp>
+      <p:sp>
+        <p:nvSpPr>
+          <p:cNvPr id="14" name="Rectangle 13"/>
+          <p:cNvSpPr/>
+          <p:nvPr/>
+        </p:nvSpPr>
+        <p:spPr>
+          <a:xfrm>
+            <a:off x="8688288" y="2201947"/>
+            <a:ext cx="984341" cy="360040"/>
+          </a:xfrm>
+          <a:prstGeom prst="rect">
+            <a:avLst/>
+          </a:prstGeom>
+        </p:spPr>
+        <p:style>
+          <a:lnRef idx="1">
+            <a:schemeClr val="accent1"/>
+          </a:lnRef>
+          <a:fillRef idx="3">
+            <a:schemeClr val="accent1"/>
+          </a:fillRef>
+          <a:effectRef idx="2">
+            <a:schemeClr val="accent1"/>
+          </a:effectRef>
+          <a:fontRef idx="minor">
+            <a:schemeClr val="lt1"/>
+          </a:fontRef>
+        </p:style>
+        <p:txBody>
+          <a:bodyPr rtlCol="0" anchor="ctr"/>
+          <a:lstStyle/>
+          <a:p>
+            <a:pPr algn="ctr"/>
+            <a:r>
+              <a:rPr lang="sv-SE" dirty="0" smtClean="0"/>
+              <a:t>TAG</a:t>
+            </a:r>
+            <a:endParaRPr lang="sv-SE" dirty="0"/>
+          </a:p>
+        </p:txBody>
+      </p:sp>
+      <p:cxnSp>
+        <p:nvCxnSpPr>
+          <p:cNvPr id="16" name="Curved Connector 15"/>
+          <p:cNvCxnSpPr>
+            <a:stCxn id="8" idx="3"/>
+            <a:endCxn id="9" idx="1"/>
+          </p:cNvCxnSpPr>
+          <p:nvPr/>
+        </p:nvCxnSpPr>
+        <p:spPr>
+          <a:xfrm>
+            <a:off x="6240016" y="3545137"/>
+            <a:ext cx="1005140" cy="7304"/>
+          </a:xfrm>
+          <a:prstGeom prst="curvedConnector3">
+            <a:avLst>
+              <a:gd name="adj1" fmla="val 50000"/>
+            </a:avLst>
+          </a:prstGeom>
+          <a:ln>
+            <a:tailEnd type="triangle"/>
+          </a:ln>
+        </p:spPr>
+        <p:style>
+          <a:lnRef idx="2">
+            <a:schemeClr val="accent1"/>
+          </a:lnRef>
+          <a:fillRef idx="0">
+            <a:schemeClr val="accent1"/>
+          </a:fillRef>
+          <a:effectRef idx="1">
+            <a:schemeClr val="accent1"/>
+          </a:effectRef>
+          <a:fontRef idx="minor">
+            <a:schemeClr val="tx1"/>
+          </a:fontRef>
+        </p:style>
+      </p:cxnSp>
+      <p:cxnSp>
+        <p:nvCxnSpPr>
+          <p:cNvPr id="19" name="Curved Connector 18"/>
+          <p:cNvCxnSpPr>
+            <a:stCxn id="9" idx="0"/>
+            <a:endCxn id="14" idx="1"/>
+          </p:cNvCxnSpPr>
+          <p:nvPr/>
+        </p:nvCxnSpPr>
+        <p:spPr>
+          <a:xfrm rot="5400000" flipH="1" flipV="1">
+            <a:off x="7759527" y="2443660"/>
+            <a:ext cx="990454" cy="867068"/>
+          </a:xfrm>
+          <a:prstGeom prst="curvedConnector2">
+            <a:avLst/>
+          </a:prstGeom>
+          <a:ln>
+            <a:tailEnd type="triangle"/>
+          </a:ln>
+        </p:spPr>
+        <p:style>
+          <a:lnRef idx="2">
+            <a:schemeClr val="accent1"/>
+          </a:lnRef>
+          <a:fillRef idx="0">
+            <a:schemeClr val="accent1"/>
+          </a:fillRef>
+          <a:effectRef idx="1">
+            <a:schemeClr val="accent1"/>
+          </a:effectRef>
+          <a:fontRef idx="minor">
+            <a:schemeClr val="tx1"/>
+          </a:fontRef>
+        </p:style>
+      </p:cxnSp>
+      <p:cxnSp>
+        <p:nvCxnSpPr>
+          <p:cNvPr id="24" name="Curved Connector 23"/>
+          <p:cNvCxnSpPr>
+            <a:stCxn id="9" idx="3"/>
+            <a:endCxn id="7" idx="0"/>
+          </p:cNvCxnSpPr>
+          <p:nvPr/>
+        </p:nvCxnSpPr>
+        <p:spPr>
+          <a:xfrm>
+            <a:off x="8397284" y="3552441"/>
+            <a:ext cx="1149902" cy="1028686"/>
+          </a:xfrm>
+          <a:prstGeom prst="curvedConnector2">
+            <a:avLst/>
+          </a:prstGeom>
+          <a:ln>
+            <a:tailEnd type="triangle"/>
+          </a:ln>
+        </p:spPr>
+        <p:style>
+          <a:lnRef idx="2">
+            <a:schemeClr val="accent1"/>
+          </a:lnRef>
+          <a:fillRef idx="0">
+            <a:schemeClr val="accent1"/>
+          </a:fillRef>
+          <a:effectRef idx="1">
+            <a:schemeClr val="accent1"/>
+          </a:effectRef>
+          <a:fontRef idx="minor">
+            <a:schemeClr val="tx1"/>
+          </a:fontRef>
+        </p:style>
+      </p:cxnSp>
+      <p:cxnSp>
+        <p:nvCxnSpPr>
+          <p:cNvPr id="26" name="Curved Connector 25"/>
+          <p:cNvCxnSpPr>
+            <a:stCxn id="4" idx="3"/>
+            <a:endCxn id="5" idx="1"/>
+          </p:cNvCxnSpPr>
+          <p:nvPr/>
+        </p:nvCxnSpPr>
+        <p:spPr>
+          <a:xfrm>
+            <a:off x="2567608" y="4761148"/>
+            <a:ext cx="1044557" cy="12700"/>
+          </a:xfrm>
+          <a:prstGeom prst="curvedConnector3">
+            <a:avLst/>
+          </a:prstGeom>
+          <a:ln>
+            <a:tailEnd type="triangle"/>
+          </a:ln>
+        </p:spPr>
+        <p:style>
+          <a:lnRef idx="2">
+            <a:schemeClr val="accent1"/>
+          </a:lnRef>
+          <a:fillRef idx="0">
+            <a:schemeClr val="accent1"/>
+          </a:fillRef>
+          <a:effectRef idx="1">
+            <a:schemeClr val="accent1"/>
+          </a:effectRef>
+          <a:fontRef idx="minor">
+            <a:schemeClr val="tx1"/>
+          </a:fontRef>
+        </p:style>
+      </p:cxnSp>
+      <p:cxnSp>
+        <p:nvCxnSpPr>
+          <p:cNvPr id="28" name="Curved Connector 27"/>
+          <p:cNvCxnSpPr>
+            <a:stCxn id="5" idx="3"/>
+            <a:endCxn id="6" idx="1"/>
+          </p:cNvCxnSpPr>
+          <p:nvPr/>
+        </p:nvCxnSpPr>
+        <p:spPr>
+          <a:xfrm>
+            <a:off x="4596506" y="4761148"/>
+            <a:ext cx="1775734" cy="12700"/>
+          </a:xfrm>
+          <a:prstGeom prst="curvedConnector3">
+            <a:avLst/>
+          </a:prstGeom>
+          <a:ln>
+            <a:tailEnd type="triangle"/>
+          </a:ln>
+        </p:spPr>
+        <p:style>
+          <a:lnRef idx="2">
+            <a:schemeClr val="accent1"/>
+          </a:lnRef>
+          <a:fillRef idx="0">
+            <a:schemeClr val="accent1"/>
+          </a:fillRef>
+          <a:effectRef idx="1">
+            <a:schemeClr val="accent1"/>
+          </a:effectRef>
+          <a:fontRef idx="minor">
+            <a:schemeClr val="tx1"/>
+          </a:fontRef>
+        </p:style>
+      </p:cxnSp>
+      <p:cxnSp>
+        <p:nvCxnSpPr>
+          <p:cNvPr id="30" name="Curved Connector 29"/>
+          <p:cNvCxnSpPr>
+            <a:stCxn id="6" idx="3"/>
+            <a:endCxn id="7" idx="1"/>
+          </p:cNvCxnSpPr>
+          <p:nvPr/>
+        </p:nvCxnSpPr>
+        <p:spPr>
+          <a:xfrm flipV="1">
+            <a:off x="7356581" y="4761147"/>
+            <a:ext cx="1698434" cy="1"/>
+          </a:xfrm>
+          <a:prstGeom prst="curvedConnector3">
+            <a:avLst/>
+          </a:prstGeom>
+          <a:ln>
+            <a:tailEnd type="triangle"/>
+          </a:ln>
+        </p:spPr>
+        <p:style>
+          <a:lnRef idx="2">
+            <a:schemeClr val="accent1"/>
+          </a:lnRef>
+          <a:fillRef idx="0">
+            <a:schemeClr val="accent1"/>
+          </a:fillRef>
+          <a:effectRef idx="1">
+            <a:schemeClr val="accent1"/>
+          </a:effectRef>
+          <a:fontRef idx="minor">
+            <a:schemeClr val="tx1"/>
+          </a:fontRef>
+        </p:style>
+      </p:cxnSp>
+      <p:sp>
+        <p:nvSpPr>
+          <p:cNvPr id="33" name="Rectangle 32"/>
+          <p:cNvSpPr/>
+          <p:nvPr/>
+        </p:nvSpPr>
+        <p:spPr>
+          <a:xfrm>
+            <a:off x="8080415" y="5829557"/>
+            <a:ext cx="1215745" cy="360040"/>
+          </a:xfrm>
+          <a:prstGeom prst="rect">
+            <a:avLst/>
+          </a:prstGeom>
+        </p:spPr>
+        <p:style>
+          <a:lnRef idx="1">
+            <a:schemeClr val="accent1"/>
+          </a:lnRef>
+          <a:fillRef idx="3">
+            <a:schemeClr val="accent1"/>
+          </a:fillRef>
+          <a:effectRef idx="2">
+            <a:schemeClr val="accent1"/>
+          </a:effectRef>
+          <a:fontRef idx="minor">
+            <a:schemeClr val="lt1"/>
+          </a:fontRef>
+        </p:style>
+        <p:txBody>
+          <a:bodyPr rtlCol="0" anchor="ctr"/>
+          <a:lstStyle/>
+          <a:p>
+            <a:pPr algn="ctr"/>
+            <a:r>
+              <a:rPr lang="sv-SE" dirty="0" err="1" smtClean="0"/>
+              <a:t>branch</a:t>
+            </a:r>
+            <a:r>
+              <a:rPr lang="sv-SE" dirty="0" smtClean="0"/>
+              <a:t> 2</a:t>
+            </a:r>
+            <a:endParaRPr lang="sv-SE" dirty="0"/>
+          </a:p>
+        </p:txBody>
+      </p:sp>
+      <p:cxnSp>
+        <p:nvCxnSpPr>
+          <p:cNvPr id="35" name="Curved Connector 34"/>
+          <p:cNvCxnSpPr>
+            <a:stCxn id="6" idx="2"/>
+            <a:endCxn id="33" idx="1"/>
+          </p:cNvCxnSpPr>
+          <p:nvPr/>
+        </p:nvCxnSpPr>
+        <p:spPr>
+          <a:xfrm rot="16200000" flipH="1">
+            <a:off x="6938209" y="4867370"/>
+            <a:ext cx="1068409" cy="1216004"/>
+          </a:xfrm>
+          <a:prstGeom prst="curvedConnector2">
+            <a:avLst/>
+          </a:prstGeom>
+          <a:ln>
+            <a:tailEnd type="triangle"/>
+          </a:ln>
+        </p:spPr>
+        <p:style>
+          <a:lnRef idx="2">
+            <a:schemeClr val="accent1"/>
+          </a:lnRef>
+          <a:fillRef idx="0">
+            <a:schemeClr val="accent1"/>
+          </a:fillRef>
+          <a:effectRef idx="1">
+            <a:schemeClr val="accent1"/>
+          </a:effectRef>
+          <a:fontRef idx="minor">
+            <a:schemeClr val="tx1"/>
+          </a:fontRef>
+        </p:style>
+      </p:cxnSp>
+      <p:sp>
+        <p:nvSpPr>
+          <p:cNvPr id="44" name="Rectangle 43"/>
+          <p:cNvSpPr/>
+          <p:nvPr/>
+        </p:nvSpPr>
+        <p:spPr>
+          <a:xfrm>
+            <a:off x="10423167" y="5813125"/>
+            <a:ext cx="1215745" cy="360040"/>
+          </a:xfrm>
+          <a:prstGeom prst="rect">
+            <a:avLst/>
+          </a:prstGeom>
+        </p:spPr>
+        <p:style>
+          <a:lnRef idx="1">
+            <a:schemeClr val="accent1"/>
+          </a:lnRef>
+          <a:fillRef idx="3">
+            <a:schemeClr val="accent1"/>
+          </a:fillRef>
+          <a:effectRef idx="2">
+            <a:schemeClr val="accent1"/>
+          </a:effectRef>
+          <a:fontRef idx="minor">
+            <a:schemeClr val="lt1"/>
+          </a:fontRef>
+        </p:style>
+        <p:txBody>
+          <a:bodyPr rtlCol="0" anchor="ctr"/>
+          <a:lstStyle/>
+          <a:p>
+            <a:pPr algn="ctr"/>
+            <a:r>
+              <a:rPr lang="sv-SE" dirty="0" err="1" smtClean="0"/>
+              <a:t>branch</a:t>
+            </a:r>
+            <a:r>
+              <a:rPr lang="sv-SE" dirty="0" smtClean="0"/>
+              <a:t> 2</a:t>
+            </a:r>
+            <a:endParaRPr lang="sv-SE" dirty="0"/>
+          </a:p>
+        </p:txBody>
+      </p:sp>
+      <p:cxnSp>
+        <p:nvCxnSpPr>
+          <p:cNvPr id="46" name="Curved Connector 45"/>
+          <p:cNvCxnSpPr>
+            <a:stCxn id="33" idx="3"/>
+            <a:endCxn id="44" idx="1"/>
+          </p:cNvCxnSpPr>
+          <p:nvPr/>
+        </p:nvCxnSpPr>
+        <p:spPr>
+          <a:xfrm flipV="1">
+            <a:off x="9296160" y="5993145"/>
+            <a:ext cx="1127007" cy="16432"/>
+          </a:xfrm>
+          <a:prstGeom prst="curvedConnector3">
+            <a:avLst/>
+          </a:prstGeom>
+          <a:ln>
+            <a:tailEnd type="triangle"/>
+          </a:ln>
+        </p:spPr>
+        <p:style>
+          <a:lnRef idx="2">
+            <a:schemeClr val="accent1"/>
+          </a:lnRef>
+          <a:fillRef idx="0">
+            <a:schemeClr val="accent1"/>
+          </a:fillRef>
+          <a:effectRef idx="1">
+            <a:schemeClr val="accent1"/>
+          </a:effectRef>
+          <a:fontRef idx="minor">
+            <a:schemeClr val="tx1"/>
+          </a:fontRef>
+        </p:style>
+      </p:cxnSp>
     </p:spTree>
     <p:extLst>
       <p:ext uri="{BB962C8B-B14F-4D97-AF65-F5344CB8AC3E}">
@@ -3966,7 +4709,7 @@
 </file>
 
 <file path=ppt/slides/slide5.xml><?xml version="1.0" encoding="utf-8"?>
-<p:sld xmlns:a="http://schemas.openxmlformats.org/drawingml/2006/main" xmlns:r="http://schemas.openxmlformats.org/officeDocument/2006/relationships" xmlns:p="http://schemas.openxmlformats.org/presentationml/2006/main">
+<p:sld xmlns:a="http://schemas.openxmlformats.org/drawingml/2006/main" xmlns:r="http://schemas.openxmlformats.org/officeDocument/2006/relationships" xmlns:p="http://schemas.openxmlformats.org/presentationml/2006/main" show="0">
   <p:cSld>
     <p:spTree>
       <p:nvGrpSpPr>
@@ -4109,6 +4852,14 @@
   <p:clrMapOvr>
     <a:masterClrMapping/>
   </p:clrMapOvr>
+  <mc:AlternateContent xmlns:mc="http://schemas.openxmlformats.org/markup-compatibility/2006">
+    <mc:Choice xmlns:p14="http://schemas.microsoft.com/office/powerpoint/2010/main" Requires="p14">
+      <p:transition spd="slow" p14:dur="2000"/>
+    </mc:Choice>
+    <mc:Fallback>
+      <p:transition spd="slow"/>
+    </mc:Fallback>
+  </mc:AlternateContent>
   <p:timing>
     <p:tnLst>
       <p:par>

</xml_diff>